<commit_message>
Forgot to add something in the ppt lol
</commit_message>
<xml_diff>
--- a/Week 1/Exercise - My First Website.pptx
+++ b/Week 1/Exercise - My First Website.pptx
@@ -297,6 +297,7 @@
           <a:p>
             <a:fld id="{D40F6773-F06E-477B-95D9-FF99BEBA6534}" type="datetimeFigureOut">
               <a:rPr lang="en-US" smtClean="0"/>
+              <a:pPr/>
               <a:t>2/2/2016</a:t>
             </a:fld>
             <a:endParaRPr lang="en-PH"/>
@@ -339,6 +340,7 @@
           <a:p>
             <a:fld id="{D3035245-AFB0-4730-B78E-A626DD7DE7B1}" type="slidenum">
               <a:rPr lang="en-PH" smtClean="0"/>
+              <a:pPr/>
               <a:t>‹#›</a:t>
             </a:fld>
             <a:endParaRPr lang="en-PH"/>
@@ -462,6 +464,7 @@
           <a:p>
             <a:fld id="{D40F6773-F06E-477B-95D9-FF99BEBA6534}" type="datetimeFigureOut">
               <a:rPr lang="en-US" smtClean="0"/>
+              <a:pPr/>
               <a:t>2/2/2016</a:t>
             </a:fld>
             <a:endParaRPr lang="en-PH"/>
@@ -504,6 +507,7 @@
           <a:p>
             <a:fld id="{D3035245-AFB0-4730-B78E-A626DD7DE7B1}" type="slidenum">
               <a:rPr lang="en-PH" smtClean="0"/>
+              <a:pPr/>
               <a:t>‹#›</a:t>
             </a:fld>
             <a:endParaRPr lang="en-PH"/>
@@ -637,6 +641,7 @@
           <a:p>
             <a:fld id="{D40F6773-F06E-477B-95D9-FF99BEBA6534}" type="datetimeFigureOut">
               <a:rPr lang="en-US" smtClean="0"/>
+              <a:pPr/>
               <a:t>2/2/2016</a:t>
             </a:fld>
             <a:endParaRPr lang="en-PH"/>
@@ -679,6 +684,7 @@
           <a:p>
             <a:fld id="{D3035245-AFB0-4730-B78E-A626DD7DE7B1}" type="slidenum">
               <a:rPr lang="en-PH" smtClean="0"/>
+              <a:pPr/>
               <a:t>‹#›</a:t>
             </a:fld>
             <a:endParaRPr lang="en-PH"/>
@@ -802,6 +808,7 @@
           <a:p>
             <a:fld id="{D40F6773-F06E-477B-95D9-FF99BEBA6534}" type="datetimeFigureOut">
               <a:rPr lang="en-US" smtClean="0"/>
+              <a:pPr/>
               <a:t>2/2/2016</a:t>
             </a:fld>
             <a:endParaRPr lang="en-PH"/>
@@ -844,6 +851,7 @@
           <a:p>
             <a:fld id="{D3035245-AFB0-4730-B78E-A626DD7DE7B1}" type="slidenum">
               <a:rPr lang="en-PH" smtClean="0"/>
+              <a:pPr/>
               <a:t>‹#›</a:t>
             </a:fld>
             <a:endParaRPr lang="en-PH"/>
@@ -1043,6 +1051,7 @@
           <a:p>
             <a:fld id="{D40F6773-F06E-477B-95D9-FF99BEBA6534}" type="datetimeFigureOut">
               <a:rPr lang="en-US" smtClean="0"/>
+              <a:pPr/>
               <a:t>2/2/2016</a:t>
             </a:fld>
             <a:endParaRPr lang="en-PH"/>
@@ -1085,6 +1094,7 @@
           <a:p>
             <a:fld id="{D3035245-AFB0-4730-B78E-A626DD7DE7B1}" type="slidenum">
               <a:rPr lang="en-PH" smtClean="0"/>
+              <a:pPr/>
               <a:t>‹#›</a:t>
             </a:fld>
             <a:endParaRPr lang="en-PH"/>
@@ -1326,6 +1336,7 @@
           <a:p>
             <a:fld id="{D40F6773-F06E-477B-95D9-FF99BEBA6534}" type="datetimeFigureOut">
               <a:rPr lang="en-US" smtClean="0"/>
+              <a:pPr/>
               <a:t>2/2/2016</a:t>
             </a:fld>
             <a:endParaRPr lang="en-PH"/>
@@ -1368,6 +1379,7 @@
           <a:p>
             <a:fld id="{D3035245-AFB0-4730-B78E-A626DD7DE7B1}" type="slidenum">
               <a:rPr lang="en-PH" smtClean="0"/>
+              <a:pPr/>
               <a:t>‹#›</a:t>
             </a:fld>
             <a:endParaRPr lang="en-PH"/>
@@ -1743,6 +1755,7 @@
           <a:p>
             <a:fld id="{D40F6773-F06E-477B-95D9-FF99BEBA6534}" type="datetimeFigureOut">
               <a:rPr lang="en-US" smtClean="0"/>
+              <a:pPr/>
               <a:t>2/2/2016</a:t>
             </a:fld>
             <a:endParaRPr lang="en-PH"/>
@@ -1785,6 +1798,7 @@
           <a:p>
             <a:fld id="{D3035245-AFB0-4730-B78E-A626DD7DE7B1}" type="slidenum">
               <a:rPr lang="en-PH" smtClean="0"/>
+              <a:pPr/>
               <a:t>‹#›</a:t>
             </a:fld>
             <a:endParaRPr lang="en-PH"/>
@@ -1856,6 +1870,7 @@
           <a:p>
             <a:fld id="{D40F6773-F06E-477B-95D9-FF99BEBA6534}" type="datetimeFigureOut">
               <a:rPr lang="en-US" smtClean="0"/>
+              <a:pPr/>
               <a:t>2/2/2016</a:t>
             </a:fld>
             <a:endParaRPr lang="en-PH"/>
@@ -1898,6 +1913,7 @@
           <a:p>
             <a:fld id="{D3035245-AFB0-4730-B78E-A626DD7DE7B1}" type="slidenum">
               <a:rPr lang="en-PH" smtClean="0"/>
+              <a:pPr/>
               <a:t>‹#›</a:t>
             </a:fld>
             <a:endParaRPr lang="en-PH"/>
@@ -1946,6 +1962,7 @@
           <a:p>
             <a:fld id="{D40F6773-F06E-477B-95D9-FF99BEBA6534}" type="datetimeFigureOut">
               <a:rPr lang="en-US" smtClean="0"/>
+              <a:pPr/>
               <a:t>2/2/2016</a:t>
             </a:fld>
             <a:endParaRPr lang="en-PH"/>
@@ -1988,6 +2005,7 @@
           <a:p>
             <a:fld id="{D3035245-AFB0-4730-B78E-A626DD7DE7B1}" type="slidenum">
               <a:rPr lang="en-PH" smtClean="0"/>
+              <a:pPr/>
               <a:t>‹#›</a:t>
             </a:fld>
             <a:endParaRPr lang="en-PH"/>
@@ -2218,6 +2236,7 @@
           <a:p>
             <a:fld id="{D40F6773-F06E-477B-95D9-FF99BEBA6534}" type="datetimeFigureOut">
               <a:rPr lang="en-US" smtClean="0"/>
+              <a:pPr/>
               <a:t>2/2/2016</a:t>
             </a:fld>
             <a:endParaRPr lang="en-PH"/>
@@ -2260,6 +2279,7 @@
           <a:p>
             <a:fld id="{D3035245-AFB0-4730-B78E-A626DD7DE7B1}" type="slidenum">
               <a:rPr lang="en-PH" smtClean="0"/>
+              <a:pPr/>
               <a:t>‹#›</a:t>
             </a:fld>
             <a:endParaRPr lang="en-PH"/>
@@ -2466,6 +2486,7 @@
           <a:p>
             <a:fld id="{D40F6773-F06E-477B-95D9-FF99BEBA6534}" type="datetimeFigureOut">
               <a:rPr lang="en-US" smtClean="0"/>
+              <a:pPr/>
               <a:t>2/2/2016</a:t>
             </a:fld>
             <a:endParaRPr lang="en-PH"/>
@@ -2508,6 +2529,7 @@
           <a:p>
             <a:fld id="{D3035245-AFB0-4730-B78E-A626DD7DE7B1}" type="slidenum">
               <a:rPr lang="en-PH" smtClean="0"/>
+              <a:pPr/>
               <a:t>‹#›</a:t>
             </a:fld>
             <a:endParaRPr lang="en-PH"/>
@@ -2674,6 +2696,7 @@
           <a:p>
             <a:fld id="{D40F6773-F06E-477B-95D9-FF99BEBA6534}" type="datetimeFigureOut">
               <a:rPr lang="en-US" smtClean="0"/>
+              <a:pPr/>
               <a:t>2/2/2016</a:t>
             </a:fld>
             <a:endParaRPr lang="en-PH"/>
@@ -2752,6 +2775,7 @@
           <a:p>
             <a:fld id="{D3035245-AFB0-4730-B78E-A626DD7DE7B1}" type="slidenum">
               <a:rPr lang="en-PH" smtClean="0"/>
+              <a:pPr/>
               <a:t>‹#›</a:t>
             </a:fld>
             <a:endParaRPr lang="en-PH"/>
@@ -3150,9 +3174,68 @@
         </p:nvSpPr>
         <p:spPr/>
         <p:txBody>
-          <a:bodyPr/>
-          <a:lstStyle/>
-          <a:p>
+          <a:bodyPr>
+            <a:normAutofit lnSpcReduction="10000"/>
+          </a:bodyPr>
+          <a:lstStyle/>
+          <a:p>
+            <a:r>
+              <a:rPr lang="en-PH" dirty="0" smtClean="0"/>
+              <a:t>Make sure you have a good internet connection</a:t>
+            </a:r>
+          </a:p>
+          <a:p>
+            <a:r>
+              <a:rPr lang="en-PH" dirty="0" smtClean="0"/>
+              <a:t>Navigate to your repository in </a:t>
+            </a:r>
+            <a:r>
+              <a:rPr lang="en-PH" dirty="0" err="1" smtClean="0"/>
+              <a:t>cmd</a:t>
+            </a:r>
+            <a:endParaRPr lang="en-PH" dirty="0" smtClean="0"/>
+          </a:p>
+          <a:p>
+            <a:r>
+              <a:rPr lang="en-PH" dirty="0" smtClean="0"/>
+              <a:t>Type “gi</a:t>
+            </a:r>
+            <a:r>
+              <a:rPr lang="en-PH" dirty="0" smtClean="0"/>
+              <a:t>t add -A”</a:t>
+            </a:r>
+          </a:p>
+          <a:p>
+            <a:r>
+              <a:rPr lang="en-PH" dirty="0" smtClean="0"/>
+              <a:t>Type “git </a:t>
+            </a:r>
+            <a:r>
+              <a:rPr lang="en-PH" smtClean="0"/>
+              <a:t>commit -m </a:t>
+            </a:r>
+            <a:r>
+              <a:rPr lang="en-PH" dirty="0" smtClean="0"/>
+              <a:t>&lt;your message&gt;”</a:t>
+            </a:r>
+          </a:p>
+          <a:p>
+            <a:r>
+              <a:rPr lang="en-PH" dirty="0" smtClean="0"/>
+              <a:t>Type “git push”</a:t>
+            </a:r>
+          </a:p>
+          <a:p>
+            <a:r>
+              <a:rPr lang="en-PH" dirty="0" smtClean="0"/>
+              <a:t>Enter your username and password</a:t>
+            </a:r>
+          </a:p>
+          <a:p>
+            <a:r>
+              <a:rPr lang="en-PH" dirty="0" smtClean="0"/>
+              <a:t>Done!</a:t>
+            </a:r>
             <a:endParaRPr lang="en-PH" dirty="0"/>
           </a:p>
         </p:txBody>

</xml_diff>